<commit_message>
Worked on Figure 1
</commit_message>
<xml_diff>
--- a/all-figures.pptx
+++ b/all-figures.pptx
@@ -246,7 +246,7 @@
           <a:p>
             <a:fld id="{32F1E84C-7904-FE47-99A3-FFD64F508AF2}" type="datetimeFigureOut">
               <a:rPr lang="en-US" smtClean="0"/>
-              <a:t>10/14/18</a:t>
+              <a:t>10/19/18</a:t>
             </a:fld>
             <a:endParaRPr lang="en-US"/>
           </a:p>
@@ -416,7 +416,7 @@
           <a:p>
             <a:fld id="{32F1E84C-7904-FE47-99A3-FFD64F508AF2}" type="datetimeFigureOut">
               <a:rPr lang="en-US" smtClean="0"/>
-              <a:t>10/14/18</a:t>
+              <a:t>10/19/18</a:t>
             </a:fld>
             <a:endParaRPr lang="en-US"/>
           </a:p>
@@ -596,7 +596,7 @@
           <a:p>
             <a:fld id="{32F1E84C-7904-FE47-99A3-FFD64F508AF2}" type="datetimeFigureOut">
               <a:rPr lang="en-US" smtClean="0"/>
-              <a:t>10/14/18</a:t>
+              <a:t>10/19/18</a:t>
             </a:fld>
             <a:endParaRPr lang="en-US"/>
           </a:p>
@@ -766,7 +766,7 @@
           <a:p>
             <a:fld id="{32F1E84C-7904-FE47-99A3-FFD64F508AF2}" type="datetimeFigureOut">
               <a:rPr lang="en-US" smtClean="0"/>
-              <a:t>10/14/18</a:t>
+              <a:t>10/19/18</a:t>
             </a:fld>
             <a:endParaRPr lang="en-US"/>
           </a:p>
@@ -1010,7 +1010,7 @@
           <a:p>
             <a:fld id="{32F1E84C-7904-FE47-99A3-FFD64F508AF2}" type="datetimeFigureOut">
               <a:rPr lang="en-US" smtClean="0"/>
-              <a:t>10/14/18</a:t>
+              <a:t>10/19/18</a:t>
             </a:fld>
             <a:endParaRPr lang="en-US"/>
           </a:p>
@@ -1242,7 +1242,7 @@
           <a:p>
             <a:fld id="{32F1E84C-7904-FE47-99A3-FFD64F508AF2}" type="datetimeFigureOut">
               <a:rPr lang="en-US" smtClean="0"/>
-              <a:t>10/14/18</a:t>
+              <a:t>10/19/18</a:t>
             </a:fld>
             <a:endParaRPr lang="en-US"/>
           </a:p>
@@ -1609,7 +1609,7 @@
           <a:p>
             <a:fld id="{32F1E84C-7904-FE47-99A3-FFD64F508AF2}" type="datetimeFigureOut">
               <a:rPr lang="en-US" smtClean="0"/>
-              <a:t>10/14/18</a:t>
+              <a:t>10/19/18</a:t>
             </a:fld>
             <a:endParaRPr lang="en-US"/>
           </a:p>
@@ -1727,7 +1727,7 @@
           <a:p>
             <a:fld id="{32F1E84C-7904-FE47-99A3-FFD64F508AF2}" type="datetimeFigureOut">
               <a:rPr lang="en-US" smtClean="0"/>
-              <a:t>10/14/18</a:t>
+              <a:t>10/19/18</a:t>
             </a:fld>
             <a:endParaRPr lang="en-US"/>
           </a:p>
@@ -1822,7 +1822,7 @@
           <a:p>
             <a:fld id="{32F1E84C-7904-FE47-99A3-FFD64F508AF2}" type="datetimeFigureOut">
               <a:rPr lang="en-US" smtClean="0"/>
-              <a:t>10/14/18</a:t>
+              <a:t>10/19/18</a:t>
             </a:fld>
             <a:endParaRPr lang="en-US"/>
           </a:p>
@@ -2099,7 +2099,7 @@
           <a:p>
             <a:fld id="{32F1E84C-7904-FE47-99A3-FFD64F508AF2}" type="datetimeFigureOut">
               <a:rPr lang="en-US" smtClean="0"/>
-              <a:t>10/14/18</a:t>
+              <a:t>10/19/18</a:t>
             </a:fld>
             <a:endParaRPr lang="en-US"/>
           </a:p>
@@ -2356,7 +2356,7 @@
           <a:p>
             <a:fld id="{32F1E84C-7904-FE47-99A3-FFD64F508AF2}" type="datetimeFigureOut">
               <a:rPr lang="en-US" smtClean="0"/>
-              <a:t>10/14/18</a:t>
+              <a:t>10/19/18</a:t>
             </a:fld>
             <a:endParaRPr lang="en-US"/>
           </a:p>
@@ -2569,7 +2569,7 @@
           <a:p>
             <a:fld id="{32F1E84C-7904-FE47-99A3-FFD64F508AF2}" type="datetimeFigureOut">
               <a:rPr lang="en-US" smtClean="0"/>
-              <a:t>10/14/18</a:t>
+              <a:t>10/19/18</a:t>
             </a:fld>
             <a:endParaRPr lang="en-US"/>
           </a:p>
@@ -3012,10 +3012,10 @@
       </p:sp>
       <p:pic>
         <p:nvPicPr>
-          <p:cNvPr id="4" name="Picture 3">
+          <p:cNvPr id="7" name="Picture 6">
             <a:extLst>
               <a:ext uri="{FF2B5EF4-FFF2-40B4-BE49-F238E27FC236}">
-                <a16:creationId xmlns:a16="http://schemas.microsoft.com/office/drawing/2014/main" id="{72409E1D-A210-0545-9435-D87DD7EC0AFF}"/>
+                <a16:creationId xmlns:a16="http://schemas.microsoft.com/office/drawing/2014/main" id="{6A334E66-0352-B341-BC1C-648197C82A47}"/>
               </a:ext>
             </a:extLst>
           </p:cNvPr>
@@ -3032,8 +3032,8 @@
         </p:blipFill>
         <p:spPr>
           <a:xfrm>
-            <a:off x="642310" y="1440128"/>
-            <a:ext cx="5617781" cy="3970462"/>
+            <a:off x="487181" y="1554757"/>
+            <a:ext cx="5778708" cy="4396283"/>
           </a:xfrm>
           <a:prstGeom prst="rect">
             <a:avLst/>

</xml_diff>

<commit_message>
satisfied with figure 2 for now
</commit_message>
<xml_diff>
--- a/all-figures.pptx
+++ b/all-figures.pptx
@@ -246,7 +246,7 @@
           <a:p>
             <a:fld id="{32F1E84C-7904-FE47-99A3-FFD64F508AF2}" type="datetimeFigureOut">
               <a:rPr lang="en-US" smtClean="0"/>
-              <a:t>10/19/18</a:t>
+              <a:t>10/21/18</a:t>
             </a:fld>
             <a:endParaRPr lang="en-US"/>
           </a:p>
@@ -416,7 +416,7 @@
           <a:p>
             <a:fld id="{32F1E84C-7904-FE47-99A3-FFD64F508AF2}" type="datetimeFigureOut">
               <a:rPr lang="en-US" smtClean="0"/>
-              <a:t>10/19/18</a:t>
+              <a:t>10/21/18</a:t>
             </a:fld>
             <a:endParaRPr lang="en-US"/>
           </a:p>
@@ -596,7 +596,7 @@
           <a:p>
             <a:fld id="{32F1E84C-7904-FE47-99A3-FFD64F508AF2}" type="datetimeFigureOut">
               <a:rPr lang="en-US" smtClean="0"/>
-              <a:t>10/19/18</a:t>
+              <a:t>10/21/18</a:t>
             </a:fld>
             <a:endParaRPr lang="en-US"/>
           </a:p>
@@ -766,7 +766,7 @@
           <a:p>
             <a:fld id="{32F1E84C-7904-FE47-99A3-FFD64F508AF2}" type="datetimeFigureOut">
               <a:rPr lang="en-US" smtClean="0"/>
-              <a:t>10/19/18</a:t>
+              <a:t>10/21/18</a:t>
             </a:fld>
             <a:endParaRPr lang="en-US"/>
           </a:p>
@@ -1010,7 +1010,7 @@
           <a:p>
             <a:fld id="{32F1E84C-7904-FE47-99A3-FFD64F508AF2}" type="datetimeFigureOut">
               <a:rPr lang="en-US" smtClean="0"/>
-              <a:t>10/19/18</a:t>
+              <a:t>10/21/18</a:t>
             </a:fld>
             <a:endParaRPr lang="en-US"/>
           </a:p>
@@ -1242,7 +1242,7 @@
           <a:p>
             <a:fld id="{32F1E84C-7904-FE47-99A3-FFD64F508AF2}" type="datetimeFigureOut">
               <a:rPr lang="en-US" smtClean="0"/>
-              <a:t>10/19/18</a:t>
+              <a:t>10/21/18</a:t>
             </a:fld>
             <a:endParaRPr lang="en-US"/>
           </a:p>
@@ -1609,7 +1609,7 @@
           <a:p>
             <a:fld id="{32F1E84C-7904-FE47-99A3-FFD64F508AF2}" type="datetimeFigureOut">
               <a:rPr lang="en-US" smtClean="0"/>
-              <a:t>10/19/18</a:t>
+              <a:t>10/21/18</a:t>
             </a:fld>
             <a:endParaRPr lang="en-US"/>
           </a:p>
@@ -1727,7 +1727,7 @@
           <a:p>
             <a:fld id="{32F1E84C-7904-FE47-99A3-FFD64F508AF2}" type="datetimeFigureOut">
               <a:rPr lang="en-US" smtClean="0"/>
-              <a:t>10/19/18</a:t>
+              <a:t>10/21/18</a:t>
             </a:fld>
             <a:endParaRPr lang="en-US"/>
           </a:p>
@@ -1822,7 +1822,7 @@
           <a:p>
             <a:fld id="{32F1E84C-7904-FE47-99A3-FFD64F508AF2}" type="datetimeFigureOut">
               <a:rPr lang="en-US" smtClean="0"/>
-              <a:t>10/19/18</a:t>
+              <a:t>10/21/18</a:t>
             </a:fld>
             <a:endParaRPr lang="en-US"/>
           </a:p>
@@ -2099,7 +2099,7 @@
           <a:p>
             <a:fld id="{32F1E84C-7904-FE47-99A3-FFD64F508AF2}" type="datetimeFigureOut">
               <a:rPr lang="en-US" smtClean="0"/>
-              <a:t>10/19/18</a:t>
+              <a:t>10/21/18</a:t>
             </a:fld>
             <a:endParaRPr lang="en-US"/>
           </a:p>
@@ -2356,7 +2356,7 @@
           <a:p>
             <a:fld id="{32F1E84C-7904-FE47-99A3-FFD64F508AF2}" type="datetimeFigureOut">
               <a:rPr lang="en-US" smtClean="0"/>
-              <a:t>10/19/18</a:t>
+              <a:t>10/21/18</a:t>
             </a:fld>
             <a:endParaRPr lang="en-US"/>
           </a:p>
@@ -2569,7 +2569,7 @@
           <a:p>
             <a:fld id="{32F1E84C-7904-FE47-99A3-FFD64F508AF2}" type="datetimeFigureOut">
               <a:rPr lang="en-US" smtClean="0"/>
-              <a:t>10/19/18</a:t>
+              <a:t>10/21/18</a:t>
             </a:fld>
             <a:endParaRPr lang="en-US"/>
           </a:p>
@@ -3158,10 +3158,10 @@
       </p:sp>
       <p:pic>
         <p:nvPicPr>
-          <p:cNvPr id="3" name="Picture 2">
+          <p:cNvPr id="4" name="Picture 3">
             <a:extLst>
               <a:ext uri="{FF2B5EF4-FFF2-40B4-BE49-F238E27FC236}">
-                <a16:creationId xmlns:a16="http://schemas.microsoft.com/office/drawing/2014/main" id="{701DBDF1-B404-E344-8D5A-CC67EE215878}"/>
+                <a16:creationId xmlns:a16="http://schemas.microsoft.com/office/drawing/2014/main" id="{A9F969FD-3DA3-E949-B9D6-73FAC557930C}"/>
               </a:ext>
             </a:extLst>
           </p:cNvPr>
@@ -3178,8 +3178,8 @@
         </p:blipFill>
         <p:spPr>
           <a:xfrm>
-            <a:off x="333451" y="1278377"/>
-            <a:ext cx="6337435" cy="4224956"/>
+            <a:off x="67029" y="1278466"/>
+            <a:ext cx="6642100" cy="2959100"/>
           </a:xfrm>
           <a:prstGeom prst="rect">
             <a:avLst/>

</xml_diff>

<commit_message>
minor changes figure 2
</commit_message>
<xml_diff>
--- a/all-figures.pptx
+++ b/all-figures.pptx
@@ -3158,10 +3158,10 @@
       </p:sp>
       <p:pic>
         <p:nvPicPr>
-          <p:cNvPr id="4" name="Picture 3">
+          <p:cNvPr id="9" name="Picture 8">
             <a:extLst>
               <a:ext uri="{FF2B5EF4-FFF2-40B4-BE49-F238E27FC236}">
-                <a16:creationId xmlns:a16="http://schemas.microsoft.com/office/drawing/2014/main" id="{A9F969FD-3DA3-E949-B9D6-73FAC557930C}"/>
+                <a16:creationId xmlns:a16="http://schemas.microsoft.com/office/drawing/2014/main" id="{4779FF76-F0DE-4F41-97D3-E78086B2D474}"/>
               </a:ext>
             </a:extLst>
           </p:cNvPr>
@@ -3178,8 +3178,8 @@
         </p:blipFill>
         <p:spPr>
           <a:xfrm>
-            <a:off x="67029" y="1278466"/>
-            <a:ext cx="6642100" cy="2959100"/>
+            <a:off x="63147" y="1139561"/>
+            <a:ext cx="6642100" cy="3022600"/>
           </a:xfrm>
           <a:prstGeom prst="rect">
             <a:avLst/>

</xml_diff>

<commit_message>
work on figure 4 and other stuff
</commit_message>
<xml_diff>
--- a/all-figures.pptx
+++ b/all-figures.pptx
@@ -2988,8 +2988,8 @@
         </p:nvSpPr>
         <p:spPr>
           <a:xfrm>
-            <a:off x="899388" y="546928"/>
-            <a:ext cx="5103627" cy="584775"/>
+            <a:off x="580445" y="292486"/>
+            <a:ext cx="5685444" cy="523220"/>
           </a:xfrm>
           <a:prstGeom prst="rect">
             <a:avLst/>
@@ -3004,18 +3004,22 @@
           <a:p>
             <a:pPr algn="just"/>
             <a:r>
-              <a:rPr lang="en-US" sz="1600" dirty="0"/>
-              <a:t>Figure 1. A simple whole-cell coarse-grained model of bacterial growth reproduces proteome allocation data.</a:t>
+              <a:rPr lang="en-US" sz="1400" b="1" dirty="0"/>
+              <a:t>Figure 1.</a:t>
+            </a:r>
+            <a:r>
+              <a:rPr lang="en-US" sz="1400" dirty="0"/>
+              <a:t> A simple whole-cell coarse-grained model of bacterial growth reproduces proteome allocation data.</a:t>
             </a:r>
           </a:p>
         </p:txBody>
       </p:sp>
       <p:pic>
         <p:nvPicPr>
-          <p:cNvPr id="7" name="Picture 6">
+          <p:cNvPr id="5" name="Picture 4">
             <a:extLst>
               <a:ext uri="{FF2B5EF4-FFF2-40B4-BE49-F238E27FC236}">
-                <a16:creationId xmlns:a16="http://schemas.microsoft.com/office/drawing/2014/main" id="{6A334E66-0352-B341-BC1C-648197C82A47}"/>
+                <a16:creationId xmlns:a16="http://schemas.microsoft.com/office/drawing/2014/main" id="{F1C057F1-9946-3C42-9B6F-31F6310A60FE}"/>
               </a:ext>
             </a:extLst>
           </p:cNvPr>
@@ -3032,8 +3036,8 @@
         </p:blipFill>
         <p:spPr>
           <a:xfrm>
-            <a:off x="487181" y="1554757"/>
-            <a:ext cx="5778708" cy="4396283"/>
+            <a:off x="487943" y="1139036"/>
+            <a:ext cx="5870448" cy="3853941"/>
           </a:xfrm>
           <a:prstGeom prst="rect">
             <a:avLst/>
@@ -3158,10 +3162,10 @@
       </p:sp>
       <p:pic>
         <p:nvPicPr>
-          <p:cNvPr id="9" name="Picture 8">
+          <p:cNvPr id="3" name="Picture 2">
             <a:extLst>
               <a:ext uri="{FF2B5EF4-FFF2-40B4-BE49-F238E27FC236}">
-                <a16:creationId xmlns:a16="http://schemas.microsoft.com/office/drawing/2014/main" id="{4779FF76-F0DE-4F41-97D3-E78086B2D474}"/>
+                <a16:creationId xmlns:a16="http://schemas.microsoft.com/office/drawing/2014/main" id="{14923B0A-74F1-C547-AFC9-3031F36F429E}"/>
               </a:ext>
             </a:extLst>
           </p:cNvPr>
@@ -3178,8 +3182,8 @@
         </p:blipFill>
         <p:spPr>
           <a:xfrm>
-            <a:off x="63147" y="1139561"/>
-            <a:ext cx="6642100" cy="3022600"/>
+            <a:off x="-8467" y="1262328"/>
+            <a:ext cx="6642100" cy="3048000"/>
           </a:xfrm>
           <a:prstGeom prst="rect">
             <a:avLst/>

</xml_diff>

<commit_message>
minor change figure 1
</commit_message>
<xml_diff>
--- a/all-figures.pptx
+++ b/all-figures.pptx
@@ -246,7 +246,7 @@
           <a:p>
             <a:fld id="{32F1E84C-7904-FE47-99A3-FFD64F508AF2}" type="datetimeFigureOut">
               <a:rPr lang="en-US" smtClean="0"/>
-              <a:t>10/26/18</a:t>
+              <a:t>10/30/18</a:t>
             </a:fld>
             <a:endParaRPr lang="en-US"/>
           </a:p>
@@ -416,7 +416,7 @@
           <a:p>
             <a:fld id="{32F1E84C-7904-FE47-99A3-FFD64F508AF2}" type="datetimeFigureOut">
               <a:rPr lang="en-US" smtClean="0"/>
-              <a:t>10/26/18</a:t>
+              <a:t>10/30/18</a:t>
             </a:fld>
             <a:endParaRPr lang="en-US"/>
           </a:p>
@@ -596,7 +596,7 @@
           <a:p>
             <a:fld id="{32F1E84C-7904-FE47-99A3-FFD64F508AF2}" type="datetimeFigureOut">
               <a:rPr lang="en-US" smtClean="0"/>
-              <a:t>10/26/18</a:t>
+              <a:t>10/30/18</a:t>
             </a:fld>
             <a:endParaRPr lang="en-US"/>
           </a:p>
@@ -766,7 +766,7 @@
           <a:p>
             <a:fld id="{32F1E84C-7904-FE47-99A3-FFD64F508AF2}" type="datetimeFigureOut">
               <a:rPr lang="en-US" smtClean="0"/>
-              <a:t>10/26/18</a:t>
+              <a:t>10/30/18</a:t>
             </a:fld>
             <a:endParaRPr lang="en-US"/>
           </a:p>
@@ -1010,7 +1010,7 @@
           <a:p>
             <a:fld id="{32F1E84C-7904-FE47-99A3-FFD64F508AF2}" type="datetimeFigureOut">
               <a:rPr lang="en-US" smtClean="0"/>
-              <a:t>10/26/18</a:t>
+              <a:t>10/30/18</a:t>
             </a:fld>
             <a:endParaRPr lang="en-US"/>
           </a:p>
@@ -1242,7 +1242,7 @@
           <a:p>
             <a:fld id="{32F1E84C-7904-FE47-99A3-FFD64F508AF2}" type="datetimeFigureOut">
               <a:rPr lang="en-US" smtClean="0"/>
-              <a:t>10/26/18</a:t>
+              <a:t>10/30/18</a:t>
             </a:fld>
             <a:endParaRPr lang="en-US"/>
           </a:p>
@@ -1609,7 +1609,7 @@
           <a:p>
             <a:fld id="{32F1E84C-7904-FE47-99A3-FFD64F508AF2}" type="datetimeFigureOut">
               <a:rPr lang="en-US" smtClean="0"/>
-              <a:t>10/26/18</a:t>
+              <a:t>10/30/18</a:t>
             </a:fld>
             <a:endParaRPr lang="en-US"/>
           </a:p>
@@ -1727,7 +1727,7 @@
           <a:p>
             <a:fld id="{32F1E84C-7904-FE47-99A3-FFD64F508AF2}" type="datetimeFigureOut">
               <a:rPr lang="en-US" smtClean="0"/>
-              <a:t>10/26/18</a:t>
+              <a:t>10/30/18</a:t>
             </a:fld>
             <a:endParaRPr lang="en-US"/>
           </a:p>
@@ -1822,7 +1822,7 @@
           <a:p>
             <a:fld id="{32F1E84C-7904-FE47-99A3-FFD64F508AF2}" type="datetimeFigureOut">
               <a:rPr lang="en-US" smtClean="0"/>
-              <a:t>10/26/18</a:t>
+              <a:t>10/30/18</a:t>
             </a:fld>
             <a:endParaRPr lang="en-US"/>
           </a:p>
@@ -2099,7 +2099,7 @@
           <a:p>
             <a:fld id="{32F1E84C-7904-FE47-99A3-FFD64F508AF2}" type="datetimeFigureOut">
               <a:rPr lang="en-US" smtClean="0"/>
-              <a:t>10/26/18</a:t>
+              <a:t>10/30/18</a:t>
             </a:fld>
             <a:endParaRPr lang="en-US"/>
           </a:p>
@@ -2356,7 +2356,7 @@
           <a:p>
             <a:fld id="{32F1E84C-7904-FE47-99A3-FFD64F508AF2}" type="datetimeFigureOut">
               <a:rPr lang="en-US" smtClean="0"/>
-              <a:t>10/26/18</a:t>
+              <a:t>10/30/18</a:t>
             </a:fld>
             <a:endParaRPr lang="en-US"/>
           </a:p>
@@ -2569,7 +2569,7 @@
           <a:p>
             <a:fld id="{32F1E84C-7904-FE47-99A3-FFD64F508AF2}" type="datetimeFigureOut">
               <a:rPr lang="en-US" smtClean="0"/>
-              <a:t>10/26/18</a:t>
+              <a:t>10/30/18</a:t>
             </a:fld>
             <a:endParaRPr lang="en-US"/>
           </a:p>
@@ -3016,10 +3016,10 @@
       </p:sp>
       <p:pic>
         <p:nvPicPr>
-          <p:cNvPr id="5" name="Picture 4">
+          <p:cNvPr id="4" name="Picture 3">
             <a:extLst>
               <a:ext uri="{FF2B5EF4-FFF2-40B4-BE49-F238E27FC236}">
-                <a16:creationId xmlns:a16="http://schemas.microsoft.com/office/drawing/2014/main" id="{F1C057F1-9946-3C42-9B6F-31F6310A60FE}"/>
+                <a16:creationId xmlns:a16="http://schemas.microsoft.com/office/drawing/2014/main" id="{CADE4904-2A67-6A40-946A-F4CDB285646D}"/>
               </a:ext>
             </a:extLst>
           </p:cNvPr>
@@ -3036,8 +3036,8 @@
         </p:blipFill>
         <p:spPr>
           <a:xfrm>
-            <a:off x="487943" y="1139036"/>
-            <a:ext cx="5870448" cy="3853941"/>
+            <a:off x="-5833" y="1178951"/>
+            <a:ext cx="6858000" cy="4738751"/>
           </a:xfrm>
           <a:prstGeom prst="rect">
             <a:avLst/>

</xml_diff>